<commit_message>
reviewed presentations, added examples and course programme
</commit_message>
<xml_diff>
--- a/lections/cpp_craft_lec_1_part_1_v1_2.pptx
+++ b/lections/cpp_craft_lec_1_part_1_v1_2.pptx
@@ -295,7 +295,8 @@
           <a:p>
             <a:fld id="{9B5BD596-6C39-4EB8-A14B-146CFC1C1D63}" type="datetimeFigureOut">
               <a:rPr lang="en-US" smtClean="0"/>
-              <a:t>10/3/2013</a:t>
+              <a:pPr/>
+              <a:t>10/4/2013</a:t>
             </a:fld>
             <a:endParaRPr lang="en-US"/>
           </a:p>
@@ -337,6 +338,7 @@
           <a:p>
             <a:fld id="{C7A60432-8ED4-48AC-B14C-8EA1CA9C63AA}" type="slidenum">
               <a:rPr lang="en-US" smtClean="0"/>
+              <a:pPr/>
               <a:t>‹#›</a:t>
             </a:fld>
             <a:endParaRPr lang="en-US"/>
@@ -460,7 +462,8 @@
           <a:p>
             <a:fld id="{9B5BD596-6C39-4EB8-A14B-146CFC1C1D63}" type="datetimeFigureOut">
               <a:rPr lang="en-US" smtClean="0"/>
-              <a:t>10/3/2013</a:t>
+              <a:pPr/>
+              <a:t>10/4/2013</a:t>
             </a:fld>
             <a:endParaRPr lang="en-US"/>
           </a:p>
@@ -502,6 +505,7 @@
           <a:p>
             <a:fld id="{C7A60432-8ED4-48AC-B14C-8EA1CA9C63AA}" type="slidenum">
               <a:rPr lang="en-US" smtClean="0"/>
+              <a:pPr/>
               <a:t>‹#›</a:t>
             </a:fld>
             <a:endParaRPr lang="en-US"/>
@@ -635,7 +639,8 @@
           <a:p>
             <a:fld id="{9B5BD596-6C39-4EB8-A14B-146CFC1C1D63}" type="datetimeFigureOut">
               <a:rPr lang="en-US" smtClean="0"/>
-              <a:t>10/3/2013</a:t>
+              <a:pPr/>
+              <a:t>10/4/2013</a:t>
             </a:fld>
             <a:endParaRPr lang="en-US"/>
           </a:p>
@@ -677,6 +682,7 @@
           <a:p>
             <a:fld id="{C7A60432-8ED4-48AC-B14C-8EA1CA9C63AA}" type="slidenum">
               <a:rPr lang="en-US" smtClean="0"/>
+              <a:pPr/>
               <a:t>‹#›</a:t>
             </a:fld>
             <a:endParaRPr lang="en-US"/>
@@ -800,7 +806,8 @@
           <a:p>
             <a:fld id="{9B5BD596-6C39-4EB8-A14B-146CFC1C1D63}" type="datetimeFigureOut">
               <a:rPr lang="en-US" smtClean="0"/>
-              <a:t>10/3/2013</a:t>
+              <a:pPr/>
+              <a:t>10/4/2013</a:t>
             </a:fld>
             <a:endParaRPr lang="en-US"/>
           </a:p>
@@ -842,6 +849,7 @@
           <a:p>
             <a:fld id="{C7A60432-8ED4-48AC-B14C-8EA1CA9C63AA}" type="slidenum">
               <a:rPr lang="en-US" smtClean="0"/>
+              <a:pPr/>
               <a:t>‹#›</a:t>
             </a:fld>
             <a:endParaRPr lang="en-US"/>
@@ -1041,7 +1049,8 @@
           <a:p>
             <a:fld id="{9B5BD596-6C39-4EB8-A14B-146CFC1C1D63}" type="datetimeFigureOut">
               <a:rPr lang="en-US" smtClean="0"/>
-              <a:t>10/3/2013</a:t>
+              <a:pPr/>
+              <a:t>10/4/2013</a:t>
             </a:fld>
             <a:endParaRPr lang="en-US"/>
           </a:p>
@@ -1083,6 +1092,7 @@
           <a:p>
             <a:fld id="{C7A60432-8ED4-48AC-B14C-8EA1CA9C63AA}" type="slidenum">
               <a:rPr lang="en-US" smtClean="0"/>
+              <a:pPr/>
               <a:t>‹#›</a:t>
             </a:fld>
             <a:endParaRPr lang="en-US"/>
@@ -1324,7 +1334,8 @@
           <a:p>
             <a:fld id="{9B5BD596-6C39-4EB8-A14B-146CFC1C1D63}" type="datetimeFigureOut">
               <a:rPr lang="en-US" smtClean="0"/>
-              <a:t>10/3/2013</a:t>
+              <a:pPr/>
+              <a:t>10/4/2013</a:t>
             </a:fld>
             <a:endParaRPr lang="en-US"/>
           </a:p>
@@ -1366,6 +1377,7 @@
           <a:p>
             <a:fld id="{C7A60432-8ED4-48AC-B14C-8EA1CA9C63AA}" type="slidenum">
               <a:rPr lang="en-US" smtClean="0"/>
+              <a:pPr/>
               <a:t>‹#›</a:t>
             </a:fld>
             <a:endParaRPr lang="en-US"/>
@@ -1741,7 +1753,8 @@
           <a:p>
             <a:fld id="{9B5BD596-6C39-4EB8-A14B-146CFC1C1D63}" type="datetimeFigureOut">
               <a:rPr lang="en-US" smtClean="0"/>
-              <a:t>10/3/2013</a:t>
+              <a:pPr/>
+              <a:t>10/4/2013</a:t>
             </a:fld>
             <a:endParaRPr lang="en-US"/>
           </a:p>
@@ -1783,6 +1796,7 @@
           <a:p>
             <a:fld id="{C7A60432-8ED4-48AC-B14C-8EA1CA9C63AA}" type="slidenum">
               <a:rPr lang="en-US" smtClean="0"/>
+              <a:pPr/>
               <a:t>‹#›</a:t>
             </a:fld>
             <a:endParaRPr lang="en-US"/>
@@ -1854,7 +1868,8 @@
           <a:p>
             <a:fld id="{9B5BD596-6C39-4EB8-A14B-146CFC1C1D63}" type="datetimeFigureOut">
               <a:rPr lang="en-US" smtClean="0"/>
-              <a:t>10/3/2013</a:t>
+              <a:pPr/>
+              <a:t>10/4/2013</a:t>
             </a:fld>
             <a:endParaRPr lang="en-US"/>
           </a:p>
@@ -1896,6 +1911,7 @@
           <a:p>
             <a:fld id="{C7A60432-8ED4-48AC-B14C-8EA1CA9C63AA}" type="slidenum">
               <a:rPr lang="en-US" smtClean="0"/>
+              <a:pPr/>
               <a:t>‹#›</a:t>
             </a:fld>
             <a:endParaRPr lang="en-US"/>
@@ -1944,7 +1960,8 @@
           <a:p>
             <a:fld id="{9B5BD596-6C39-4EB8-A14B-146CFC1C1D63}" type="datetimeFigureOut">
               <a:rPr lang="en-US" smtClean="0"/>
-              <a:t>10/3/2013</a:t>
+              <a:pPr/>
+              <a:t>10/4/2013</a:t>
             </a:fld>
             <a:endParaRPr lang="en-US"/>
           </a:p>
@@ -1986,6 +2003,7 @@
           <a:p>
             <a:fld id="{C7A60432-8ED4-48AC-B14C-8EA1CA9C63AA}" type="slidenum">
               <a:rPr lang="en-US" smtClean="0"/>
+              <a:pPr/>
               <a:t>‹#›</a:t>
             </a:fld>
             <a:endParaRPr lang="en-US"/>
@@ -2216,7 +2234,8 @@
           <a:p>
             <a:fld id="{9B5BD596-6C39-4EB8-A14B-146CFC1C1D63}" type="datetimeFigureOut">
               <a:rPr lang="en-US" smtClean="0"/>
-              <a:t>10/3/2013</a:t>
+              <a:pPr/>
+              <a:t>10/4/2013</a:t>
             </a:fld>
             <a:endParaRPr lang="en-US"/>
           </a:p>
@@ -2258,6 +2277,7 @@
           <a:p>
             <a:fld id="{C7A60432-8ED4-48AC-B14C-8EA1CA9C63AA}" type="slidenum">
               <a:rPr lang="en-US" smtClean="0"/>
+              <a:pPr/>
               <a:t>‹#›</a:t>
             </a:fld>
             <a:endParaRPr lang="en-US"/>
@@ -2464,7 +2484,8 @@
           <a:p>
             <a:fld id="{9B5BD596-6C39-4EB8-A14B-146CFC1C1D63}" type="datetimeFigureOut">
               <a:rPr lang="en-US" smtClean="0"/>
-              <a:t>10/3/2013</a:t>
+              <a:pPr/>
+              <a:t>10/4/2013</a:t>
             </a:fld>
             <a:endParaRPr lang="en-US"/>
           </a:p>
@@ -2506,6 +2527,7 @@
           <a:p>
             <a:fld id="{C7A60432-8ED4-48AC-B14C-8EA1CA9C63AA}" type="slidenum">
               <a:rPr lang="en-US" smtClean="0"/>
+              <a:pPr/>
               <a:t>‹#›</a:t>
             </a:fld>
             <a:endParaRPr lang="en-US"/>
@@ -2672,7 +2694,8 @@
           <a:p>
             <a:fld id="{9B5BD596-6C39-4EB8-A14B-146CFC1C1D63}" type="datetimeFigureOut">
               <a:rPr lang="en-US" smtClean="0"/>
-              <a:t>10/3/2013</a:t>
+              <a:pPr/>
+              <a:t>10/4/2013</a:t>
             </a:fld>
             <a:endParaRPr lang="en-US"/>
           </a:p>
@@ -2750,6 +2773,7 @@
           <a:p>
             <a:fld id="{C7A60432-8ED4-48AC-B14C-8EA1CA9C63AA}" type="slidenum">
               <a:rPr lang="en-US" smtClean="0"/>
+              <a:pPr/>
               <a:t>‹#›</a:t>
             </a:fld>
             <a:endParaRPr lang="en-US"/>
@@ -3282,11 +3306,7 @@
           <a:p>
             <a:r>
               <a:rPr lang="ru-RU" dirty="0" smtClean="0"/>
-              <a:t>Цели </a:t>
-            </a:r>
-            <a:r>
-              <a:rPr lang="ru-RU" dirty="0" smtClean="0"/>
-              <a:t>курса</a:t>
+              <a:t>Цели курса</a:t>
             </a:r>
             <a:endParaRPr lang="en-US" dirty="0"/>
           </a:p>
@@ -3312,11 +3332,7 @@
             <a:pPr algn="just"/>
             <a:r>
               <a:rPr lang="ru-RU" sz="2800" dirty="0" smtClean="0"/>
-              <a:t>Научиться чему-то </a:t>
-            </a:r>
-            <a:r>
-              <a:rPr lang="ru-RU" sz="2800" dirty="0" smtClean="0"/>
-              <a:t>новому - как вам так и нам. </a:t>
+              <a:t>Научиться чему-то новому - как вам так и нам. </a:t>
             </a:r>
             <a:r>
               <a:rPr lang="ru-RU" sz="2800" dirty="0" smtClean="0">
@@ -3330,11 +3346,7 @@
             <a:pPr algn="just"/>
             <a:r>
               <a:rPr lang="ru-RU" sz="2800" dirty="0" smtClean="0"/>
-              <a:t>Получить практические навыки в задачах максимально приближенных к боевым</a:t>
-            </a:r>
-            <a:r>
-              <a:rPr lang="ru-RU" sz="2800" dirty="0" smtClean="0"/>
-              <a:t>.</a:t>
+              <a:t>Получить практические навыки в задачах максимально приближенных к боевым.</a:t>
             </a:r>
           </a:p>
           <a:p>
@@ -3546,24 +3558,21 @@
             </a:r>
             <a:r>
               <a:rPr lang="en-US" sz="2400" dirty="0" smtClean="0"/>
-              <a:t>boost: thread, </a:t>
-            </a:r>
-            <a:r>
-              <a:rPr lang="en-US" sz="2400" dirty="0" err="1" smtClean="0"/>
-              <a:t>mutex</a:t>
+              <a:t>boost:</a:t>
+            </a:r>
+            <a:r>
+              <a:rPr lang="en-US" sz="2400" dirty="0" smtClean="0"/>
+              <a:t>:</a:t>
+            </a:r>
+            <a:r>
+              <a:rPr lang="en-US" sz="2400" dirty="0" smtClean="0"/>
+              <a:t>thread</a:t>
             </a:r>
             <a:r>
               <a:rPr lang="en-US" sz="2400" dirty="0" smtClean="0"/>
               <a:t>, </a:t>
             </a:r>
-            <a:r>
-              <a:rPr lang="en-US" sz="2400" dirty="0" err="1" smtClean="0"/>
-              <a:t>recursive_mutex</a:t>
-            </a:r>
-            <a:r>
-              <a:rPr lang="en-US" sz="2400" dirty="0" smtClean="0"/>
-              <a:t>, condition.</a:t>
-            </a:r>
+            <a:endParaRPr lang="en-US" sz="2400" dirty="0" smtClean="0"/>
           </a:p>
           <a:p>
             <a:pPr>
@@ -3572,8 +3581,44 @@
               </a:spcBef>
             </a:pPr>
             <a:r>
-              <a:rPr lang="ru-RU" sz="2400" dirty="0" smtClean="0"/>
-              <a:t>Сетевое программирование.</a:t>
+              <a:rPr lang="en-US" sz="2400" dirty="0" smtClean="0"/>
+              <a:t>boost::</a:t>
+            </a:r>
+            <a:r>
+              <a:rPr lang="en-US" sz="2400" dirty="0" err="1" smtClean="0"/>
+              <a:t>mutex</a:t>
+            </a:r>
+            <a:r>
+              <a:rPr lang="en-US" sz="2400" dirty="0" smtClean="0"/>
+              <a:t>, </a:t>
+            </a:r>
+            <a:r>
+              <a:rPr lang="en-US" sz="2400" dirty="0" smtClean="0"/>
+              <a:t>boost</a:t>
+            </a:r>
+            <a:r>
+              <a:rPr lang="en-US" sz="2400" dirty="0" smtClean="0"/>
+              <a:t>::</a:t>
+            </a:r>
+            <a:r>
+              <a:rPr lang="en-US" sz="2400" dirty="0" err="1" smtClean="0"/>
+              <a:t>recursive_mutex</a:t>
+            </a:r>
+            <a:r>
+              <a:rPr lang="en-US" sz="2400" dirty="0" smtClean="0"/>
+              <a:t>, </a:t>
+            </a:r>
+            <a:r>
+              <a:rPr lang="en-US" sz="2400" dirty="0" smtClean="0"/>
+              <a:t>boost</a:t>
+            </a:r>
+            <a:r>
+              <a:rPr lang="en-US" sz="2400" dirty="0" smtClean="0"/>
+              <a:t>::condition</a:t>
+            </a:r>
+            <a:r>
+              <a:rPr lang="en-US" sz="2400" dirty="0" smtClean="0"/>
+              <a:t>.</a:t>
             </a:r>
           </a:p>
           <a:p>
@@ -3583,10 +3628,9 @@
               </a:spcBef>
             </a:pPr>
             <a:r>
-              <a:rPr lang="en-US" sz="2400" dirty="0" smtClean="0"/>
-              <a:t>Task-based engine, thread-based engine</a:t>
-            </a:r>
-            <a:endParaRPr lang="ru-RU" sz="2400" dirty="0" smtClean="0"/>
+              <a:rPr lang="ru-RU" sz="2400" dirty="0" smtClean="0"/>
+              <a:t>Сетевое программирование.</a:t>
+            </a:r>
           </a:p>
           <a:p>
             <a:pPr>
@@ -3596,8 +3640,13 @@
             </a:pPr>
             <a:r>
               <a:rPr lang="en-US" sz="2400" dirty="0" smtClean="0"/>
-              <a:t>VLD</a:t>
-            </a:r>
+              <a:t>Task-based engine, thread-based </a:t>
+            </a:r>
+            <a:r>
+              <a:rPr lang="en-US" sz="2400" dirty="0" smtClean="0"/>
+              <a:t>engine.</a:t>
+            </a:r>
+            <a:endParaRPr lang="ru-RU" sz="2400" dirty="0" smtClean="0"/>
           </a:p>
           <a:p>
             <a:pPr>
@@ -3606,8 +3655,24 @@
               </a:spcBef>
             </a:pPr>
             <a:r>
+              <a:rPr lang="en-US" sz="2400" dirty="0" smtClean="0"/>
+              <a:t>VLD.</a:t>
+            </a:r>
+            <a:endParaRPr lang="en-US" sz="2400" dirty="0" smtClean="0"/>
+          </a:p>
+          <a:p>
+            <a:pPr>
+              <a:spcBef>
+                <a:spcPts val="0"/>
+              </a:spcBef>
+            </a:pPr>
+            <a:r>
               <a:rPr lang="ru-RU" sz="2400" dirty="0" err="1" smtClean="0"/>
               <a:t>system_utilities</a:t>
+            </a:r>
+            <a:r>
+              <a:rPr lang="en-US" sz="2400" dirty="0" smtClean="0"/>
+              <a:t>.</a:t>
             </a:r>
             <a:endParaRPr lang="en-US" sz="2400" dirty="0" smtClean="0"/>
           </a:p>
@@ -3730,17 +3795,7 @@
                   </a:schemeClr>
                 </a:solidFill>
               </a:rPr>
-              <a:t> pull </a:t>
-            </a:r>
-            <a:r>
-              <a:rPr lang="en-US" b="1" dirty="0" smtClean="0">
-                <a:solidFill>
-                  <a:schemeClr val="accent2">
-                    <a:lumMod val="75000"/>
-                  </a:schemeClr>
-                </a:solidFill>
-              </a:rPr>
-              <a:t>origin master</a:t>
+              <a:t> pull origin master</a:t>
             </a:r>
             <a:r>
               <a:rPr lang="ru-RU" b="1" dirty="0" smtClean="0">
@@ -3763,13 +3818,8 @@
           <a:p>
             <a:r>
               <a:rPr lang="ru-RU" dirty="0" smtClean="0"/>
-              <a:t>Проверить статус, решить </a:t>
-            </a:r>
-            <a:r>
-              <a:rPr lang="ru-RU" dirty="0" smtClean="0"/>
-              <a:t>конфликты.</a:t>
-            </a:r>
-            <a:endParaRPr lang="ru-RU" dirty="0" smtClean="0"/>
+              <a:t>Проверить статус, решить конфликты.</a:t>
+            </a:r>
           </a:p>
           <a:p>
             <a:r>
@@ -3832,7 +3882,7 @@
                   </a:schemeClr>
                 </a:solidFill>
               </a:rPr>
-              <a:t>Сообщения </a:t>
+              <a:t>Сообщения можно </a:t>
             </a:r>
             <a:r>
               <a:rPr lang="ru-RU" b="1" dirty="0" smtClean="0">
@@ -3842,7 +3892,27 @@
                   </a:schemeClr>
                 </a:solidFill>
               </a:rPr>
-              <a:t>можно исправлять!</a:t>
+              <a:t>и нужно </a:t>
+            </a:r>
+            <a:r>
+              <a:rPr lang="ru-RU" b="1" dirty="0" smtClean="0">
+                <a:solidFill>
+                  <a:schemeClr val="accent2">
+                    <a:lumMod val="75000"/>
+                  </a:schemeClr>
+                </a:solidFill>
+              </a:rPr>
+              <a:t>исправлять</a:t>
+            </a:r>
+            <a:r>
+              <a:rPr lang="ru-RU" b="1" dirty="0" smtClean="0">
+                <a:solidFill>
+                  <a:schemeClr val="accent2">
+                    <a:lumMod val="75000"/>
+                  </a:schemeClr>
+                </a:solidFill>
+              </a:rPr>
+              <a:t>!</a:t>
             </a:r>
           </a:p>
           <a:p>
@@ -3936,7 +4006,6 @@
               <a:rPr lang="en-US" sz="2000" i="1" dirty="0" smtClean="0"/>
               <a:t> </a:t>
             </a:r>
-            <a:endParaRPr lang="en-US" sz="2000" i="1" dirty="0" smtClean="0"/>
           </a:p>
         </p:txBody>
       </p:sp>
@@ -4248,7 +4317,19 @@
           <a:p>
             <a:r>
               <a:rPr lang="en-US" dirty="0" smtClean="0"/>
-              <a:t>Linux – QT Creator</a:t>
+              <a:t>Linux </a:t>
+            </a:r>
+            <a:r>
+              <a:rPr lang="en-US" smtClean="0"/>
+              <a:t>– </a:t>
+            </a:r>
+            <a:r>
+              <a:rPr lang="en-US" smtClean="0"/>
+              <a:t>Qt </a:t>
+            </a:r>
+            <a:r>
+              <a:rPr lang="en-US" dirty="0" smtClean="0"/>
+              <a:t>Creator</a:t>
             </a:r>
           </a:p>
           <a:p>

</xml_diff>

<commit_message>
added dzen-cat to the presentation
</commit_message>
<xml_diff>
--- a/lections/cpp_craft_lec_1_part_1_v1_2.pptx
+++ b/lections/cpp_craft_lec_1_part_1_v1_2.pptx
@@ -296,7 +296,7 @@
             <a:fld id="{9B5BD596-6C39-4EB8-A14B-146CFC1C1D63}" type="datetimeFigureOut">
               <a:rPr lang="en-US" smtClean="0"/>
               <a:pPr/>
-              <a:t>10/4/2013</a:t>
+              <a:t>10/7/2013</a:t>
             </a:fld>
             <a:endParaRPr lang="en-US"/>
           </a:p>
@@ -463,7 +463,7 @@
             <a:fld id="{9B5BD596-6C39-4EB8-A14B-146CFC1C1D63}" type="datetimeFigureOut">
               <a:rPr lang="en-US" smtClean="0"/>
               <a:pPr/>
-              <a:t>10/4/2013</a:t>
+              <a:t>10/7/2013</a:t>
             </a:fld>
             <a:endParaRPr lang="en-US"/>
           </a:p>
@@ -640,7 +640,7 @@
             <a:fld id="{9B5BD596-6C39-4EB8-A14B-146CFC1C1D63}" type="datetimeFigureOut">
               <a:rPr lang="en-US" smtClean="0"/>
               <a:pPr/>
-              <a:t>10/4/2013</a:t>
+              <a:t>10/7/2013</a:t>
             </a:fld>
             <a:endParaRPr lang="en-US"/>
           </a:p>
@@ -807,7 +807,7 @@
             <a:fld id="{9B5BD596-6C39-4EB8-A14B-146CFC1C1D63}" type="datetimeFigureOut">
               <a:rPr lang="en-US" smtClean="0"/>
               <a:pPr/>
-              <a:t>10/4/2013</a:t>
+              <a:t>10/7/2013</a:t>
             </a:fld>
             <a:endParaRPr lang="en-US"/>
           </a:p>
@@ -1050,7 +1050,7 @@
             <a:fld id="{9B5BD596-6C39-4EB8-A14B-146CFC1C1D63}" type="datetimeFigureOut">
               <a:rPr lang="en-US" smtClean="0"/>
               <a:pPr/>
-              <a:t>10/4/2013</a:t>
+              <a:t>10/7/2013</a:t>
             </a:fld>
             <a:endParaRPr lang="en-US"/>
           </a:p>
@@ -1335,7 +1335,7 @@
             <a:fld id="{9B5BD596-6C39-4EB8-A14B-146CFC1C1D63}" type="datetimeFigureOut">
               <a:rPr lang="en-US" smtClean="0"/>
               <a:pPr/>
-              <a:t>10/4/2013</a:t>
+              <a:t>10/7/2013</a:t>
             </a:fld>
             <a:endParaRPr lang="en-US"/>
           </a:p>
@@ -1754,7 +1754,7 @@
             <a:fld id="{9B5BD596-6C39-4EB8-A14B-146CFC1C1D63}" type="datetimeFigureOut">
               <a:rPr lang="en-US" smtClean="0"/>
               <a:pPr/>
-              <a:t>10/4/2013</a:t>
+              <a:t>10/7/2013</a:t>
             </a:fld>
             <a:endParaRPr lang="en-US"/>
           </a:p>
@@ -1869,7 +1869,7 @@
             <a:fld id="{9B5BD596-6C39-4EB8-A14B-146CFC1C1D63}" type="datetimeFigureOut">
               <a:rPr lang="en-US" smtClean="0"/>
               <a:pPr/>
-              <a:t>10/4/2013</a:t>
+              <a:t>10/7/2013</a:t>
             </a:fld>
             <a:endParaRPr lang="en-US"/>
           </a:p>
@@ -1961,7 +1961,7 @@
             <a:fld id="{9B5BD596-6C39-4EB8-A14B-146CFC1C1D63}" type="datetimeFigureOut">
               <a:rPr lang="en-US" smtClean="0"/>
               <a:pPr/>
-              <a:t>10/4/2013</a:t>
+              <a:t>10/7/2013</a:t>
             </a:fld>
             <a:endParaRPr lang="en-US"/>
           </a:p>
@@ -2235,7 +2235,7 @@
             <a:fld id="{9B5BD596-6C39-4EB8-A14B-146CFC1C1D63}" type="datetimeFigureOut">
               <a:rPr lang="en-US" smtClean="0"/>
               <a:pPr/>
-              <a:t>10/4/2013</a:t>
+              <a:t>10/7/2013</a:t>
             </a:fld>
             <a:endParaRPr lang="en-US"/>
           </a:p>
@@ -2485,7 +2485,7 @@
             <a:fld id="{9B5BD596-6C39-4EB8-A14B-146CFC1C1D63}" type="datetimeFigureOut">
               <a:rPr lang="en-US" smtClean="0"/>
               <a:pPr/>
-              <a:t>10/4/2013</a:t>
+              <a:t>10/7/2013</a:t>
             </a:fld>
             <a:endParaRPr lang="en-US"/>
           </a:p>
@@ -2695,7 +2695,7 @@
             <a:fld id="{9B5BD596-6C39-4EB8-A14B-146CFC1C1D63}" type="datetimeFigureOut">
               <a:rPr lang="en-US" smtClean="0"/>
               <a:pPr/>
-              <a:t>10/4/2013</a:t>
+              <a:t>10/7/2013</a:t>
             </a:fld>
             <a:endParaRPr lang="en-US"/>
           </a:p>
@@ -3558,21 +3558,8 @@
             </a:r>
             <a:r>
               <a:rPr lang="en-US" sz="2400" dirty="0" smtClean="0"/>
-              <a:t>boost:</a:t>
-            </a:r>
-            <a:r>
-              <a:rPr lang="en-US" sz="2400" dirty="0" smtClean="0"/>
-              <a:t>:</a:t>
-            </a:r>
-            <a:r>
-              <a:rPr lang="en-US" sz="2400" dirty="0" smtClean="0"/>
-              <a:t>thread</a:t>
-            </a:r>
-            <a:r>
-              <a:rPr lang="en-US" sz="2400" dirty="0" smtClean="0"/>
-              <a:t>, </a:t>
-            </a:r>
-            <a:endParaRPr lang="en-US" sz="2400" dirty="0" smtClean="0"/>
+              <a:t>boost::thread, </a:t>
+            </a:r>
           </a:p>
           <a:p>
             <a:pPr>
@@ -3590,15 +3577,7 @@
             </a:r>
             <a:r>
               <a:rPr lang="en-US" sz="2400" dirty="0" smtClean="0"/>
-              <a:t>, </a:t>
-            </a:r>
-            <a:r>
-              <a:rPr lang="en-US" sz="2400" dirty="0" smtClean="0"/>
-              <a:t>boost</a:t>
-            </a:r>
-            <a:r>
-              <a:rPr lang="en-US" sz="2400" dirty="0" smtClean="0"/>
-              <a:t>::</a:t>
+              <a:t>, boost::</a:t>
             </a:r>
             <a:r>
               <a:rPr lang="en-US" sz="2400" dirty="0" err="1" smtClean="0"/>
@@ -3606,19 +3585,7 @@
             </a:r>
             <a:r>
               <a:rPr lang="en-US" sz="2400" dirty="0" smtClean="0"/>
-              <a:t>, </a:t>
-            </a:r>
-            <a:r>
-              <a:rPr lang="en-US" sz="2400" dirty="0" smtClean="0"/>
-              <a:t>boost</a:t>
-            </a:r>
-            <a:r>
-              <a:rPr lang="en-US" sz="2400" dirty="0" smtClean="0"/>
-              <a:t>::condition</a:t>
-            </a:r>
-            <a:r>
-              <a:rPr lang="en-US" sz="2400" dirty="0" smtClean="0"/>
-              <a:t>.</a:t>
+              <a:t>, boost::condition.</a:t>
             </a:r>
           </a:p>
           <a:p>
@@ -3640,11 +3607,7 @@
             </a:pPr>
             <a:r>
               <a:rPr lang="en-US" sz="2400" dirty="0" smtClean="0"/>
-              <a:t>Task-based engine, thread-based </a:t>
-            </a:r>
-            <a:r>
-              <a:rPr lang="en-US" sz="2400" dirty="0" smtClean="0"/>
-              <a:t>engine.</a:t>
+              <a:t>Task-based engine, thread-based engine.</a:t>
             </a:r>
             <a:endParaRPr lang="ru-RU" sz="2400" dirty="0" smtClean="0"/>
           </a:p>
@@ -3658,7 +3621,6 @@
               <a:rPr lang="en-US" sz="2400" dirty="0" smtClean="0"/>
               <a:t>VLD.</a:t>
             </a:r>
-            <a:endParaRPr lang="en-US" sz="2400" dirty="0" smtClean="0"/>
           </a:p>
           <a:p>
             <a:pPr>
@@ -3674,7 +3636,6 @@
               <a:rPr lang="en-US" sz="2400" dirty="0" smtClean="0"/>
               <a:t>.</a:t>
             </a:r>
-            <a:endParaRPr lang="en-US" sz="2400" dirty="0" smtClean="0"/>
           </a:p>
           <a:p>
             <a:pPr>
@@ -3882,37 +3843,7 @@
                   </a:schemeClr>
                 </a:solidFill>
               </a:rPr>
-              <a:t>Сообщения можно </a:t>
-            </a:r>
-            <a:r>
-              <a:rPr lang="ru-RU" b="1" dirty="0" smtClean="0">
-                <a:solidFill>
-                  <a:schemeClr val="accent2">
-                    <a:lumMod val="75000"/>
-                  </a:schemeClr>
-                </a:solidFill>
-              </a:rPr>
-              <a:t>и нужно </a:t>
-            </a:r>
-            <a:r>
-              <a:rPr lang="ru-RU" b="1" dirty="0" smtClean="0">
-                <a:solidFill>
-                  <a:schemeClr val="accent2">
-                    <a:lumMod val="75000"/>
-                  </a:schemeClr>
-                </a:solidFill>
-              </a:rPr>
-              <a:t>исправлять</a:t>
-            </a:r>
-            <a:r>
-              <a:rPr lang="ru-RU" b="1" dirty="0" smtClean="0">
-                <a:solidFill>
-                  <a:schemeClr val="accent2">
-                    <a:lumMod val="75000"/>
-                  </a:schemeClr>
-                </a:solidFill>
-              </a:rPr>
-              <a:t>!</a:t>
+              <a:t>Сообщения можно и нужно исправлять!</a:t>
             </a:r>
           </a:p>
           <a:p>
@@ -4317,20 +4248,17 @@
           <a:p>
             <a:r>
               <a:rPr lang="en-US" dirty="0" smtClean="0"/>
-              <a:t>Linux </a:t>
-            </a:r>
-            <a:r>
-              <a:rPr lang="en-US" smtClean="0"/>
-              <a:t>– </a:t>
-            </a:r>
-            <a:r>
-              <a:rPr lang="en-US" smtClean="0"/>
-              <a:t>Qt </a:t>
+              <a:t>Linux – Qt </a:t>
             </a:r>
             <a:r>
               <a:rPr lang="en-US" dirty="0" smtClean="0"/>
-              <a:t>Creator</a:t>
-            </a:r>
+              <a:t>Creator, Code::</a:t>
+            </a:r>
+            <a:r>
+              <a:rPr lang="en-US" dirty="0" smtClean="0"/>
+              <a:t>Blocks</a:t>
+            </a:r>
+            <a:endParaRPr lang="en-US" dirty="0" smtClean="0"/>
           </a:p>
           <a:p>
             <a:r>

</xml_diff>